<commit_message>
WIP slides + automatic kernel output reordering
</commit_message>
<xml_diff>
--- a/docs/Slides.pptx
+++ b/docs/Slides.pptx
@@ -286,7 +286,7 @@
           <a:p>
             <a:fld id="{E8B97DC6-8026-4A75-858C-DCC3FDFB3DAA}" type="datetimeFigureOut">
               <a:rPr lang="fr-FR" smtClean="0"/>
-              <a:t>28/01/2025</a:t>
+              <a:t>29/01/2025</a:t>
             </a:fld>
             <a:endParaRPr lang="fr-FR"/>
           </a:p>
@@ -484,7 +484,7 @@
           <a:p>
             <a:fld id="{E8B97DC6-8026-4A75-858C-DCC3FDFB3DAA}" type="datetimeFigureOut">
               <a:rPr lang="fr-FR" smtClean="0"/>
-              <a:t>28/01/2025</a:t>
+              <a:t>29/01/2025</a:t>
             </a:fld>
             <a:endParaRPr lang="fr-FR"/>
           </a:p>
@@ -692,7 +692,7 @@
           <a:p>
             <a:fld id="{E8B97DC6-8026-4A75-858C-DCC3FDFB3DAA}" type="datetimeFigureOut">
               <a:rPr lang="fr-FR" smtClean="0"/>
-              <a:t>28/01/2025</a:t>
+              <a:t>29/01/2025</a:t>
             </a:fld>
             <a:endParaRPr lang="fr-FR"/>
           </a:p>
@@ -890,7 +890,7 @@
           <a:p>
             <a:fld id="{E8B97DC6-8026-4A75-858C-DCC3FDFB3DAA}" type="datetimeFigureOut">
               <a:rPr lang="fr-FR" smtClean="0"/>
-              <a:t>28/01/2025</a:t>
+              <a:t>29/01/2025</a:t>
             </a:fld>
             <a:endParaRPr lang="fr-FR"/>
           </a:p>
@@ -1165,7 +1165,7 @@
           <a:p>
             <a:fld id="{E8B97DC6-8026-4A75-858C-DCC3FDFB3DAA}" type="datetimeFigureOut">
               <a:rPr lang="fr-FR" smtClean="0"/>
-              <a:t>28/01/2025</a:t>
+              <a:t>29/01/2025</a:t>
             </a:fld>
             <a:endParaRPr lang="fr-FR"/>
           </a:p>
@@ -1430,7 +1430,7 @@
           <a:p>
             <a:fld id="{E8B97DC6-8026-4A75-858C-DCC3FDFB3DAA}" type="datetimeFigureOut">
               <a:rPr lang="fr-FR" smtClean="0"/>
-              <a:t>28/01/2025</a:t>
+              <a:t>29/01/2025</a:t>
             </a:fld>
             <a:endParaRPr lang="fr-FR"/>
           </a:p>
@@ -1842,7 +1842,7 @@
           <a:p>
             <a:fld id="{E8B97DC6-8026-4A75-858C-DCC3FDFB3DAA}" type="datetimeFigureOut">
               <a:rPr lang="fr-FR" smtClean="0"/>
-              <a:t>28/01/2025</a:t>
+              <a:t>29/01/2025</a:t>
             </a:fld>
             <a:endParaRPr lang="fr-FR"/>
           </a:p>
@@ -1983,7 +1983,7 @@
           <a:p>
             <a:fld id="{E8B97DC6-8026-4A75-858C-DCC3FDFB3DAA}" type="datetimeFigureOut">
               <a:rPr lang="fr-FR" smtClean="0"/>
-              <a:t>28/01/2025</a:t>
+              <a:t>29/01/2025</a:t>
             </a:fld>
             <a:endParaRPr lang="fr-FR"/>
           </a:p>
@@ -2096,7 +2096,7 @@
           <a:p>
             <a:fld id="{E8B97DC6-8026-4A75-858C-DCC3FDFB3DAA}" type="datetimeFigureOut">
               <a:rPr lang="fr-FR" smtClean="0"/>
-              <a:t>28/01/2025</a:t>
+              <a:t>29/01/2025</a:t>
             </a:fld>
             <a:endParaRPr lang="fr-FR"/>
           </a:p>
@@ -2407,7 +2407,7 @@
           <a:p>
             <a:fld id="{E8B97DC6-8026-4A75-858C-DCC3FDFB3DAA}" type="datetimeFigureOut">
               <a:rPr lang="fr-FR" smtClean="0"/>
-              <a:t>28/01/2025</a:t>
+              <a:t>29/01/2025</a:t>
             </a:fld>
             <a:endParaRPr lang="fr-FR"/>
           </a:p>
@@ -2695,7 +2695,7 @@
           <a:p>
             <a:fld id="{E8B97DC6-8026-4A75-858C-DCC3FDFB3DAA}" type="datetimeFigureOut">
               <a:rPr lang="fr-FR" smtClean="0"/>
-              <a:t>28/01/2025</a:t>
+              <a:t>29/01/2025</a:t>
             </a:fld>
             <a:endParaRPr lang="fr-FR"/>
           </a:p>
@@ -2936,7 +2936,7 @@
           <a:p>
             <a:fld id="{E8B97DC6-8026-4A75-858C-DCC3FDFB3DAA}" type="datetimeFigureOut">
               <a:rPr lang="fr-FR" smtClean="0"/>
-              <a:t>28/01/2025</a:t>
+              <a:t>29/01/2025</a:t>
             </a:fld>
             <a:endParaRPr lang="fr-FR"/>
           </a:p>
@@ -4108,7 +4108,13 @@
           <a:bodyPr/>
           <a:lstStyle/>
           <a:p>
-            <a:endParaRPr lang="fr-FR" dirty="0"/>
+            <a:pPr marL="0" indent="0">
+              <a:buNone/>
+            </a:pPr>
+            <a:r>
+              <a:rPr lang="fr-FR" dirty="0"/>
+              <a:t> </a:t>
+            </a:r>
           </a:p>
         </p:txBody>
       </p:sp>
@@ -4231,7 +4237,13 @@
           <a:bodyPr/>
           <a:lstStyle/>
           <a:p>
-            <a:endParaRPr lang="fr-FR" dirty="0"/>
+            <a:pPr marL="0" indent="0">
+              <a:buNone/>
+            </a:pPr>
+            <a:r>
+              <a:rPr lang="fr-FR" dirty="0"/>
+              <a:t> </a:t>
+            </a:r>
           </a:p>
         </p:txBody>
       </p:sp>
@@ -4608,21 +4620,32 @@
             <p:ph sz="half" idx="1"/>
           </p:nvPr>
         </p:nvSpPr>
-        <p:spPr/>
-        <p:txBody>
-          <a:bodyPr/>
-          <a:lstStyle/>
-          <a:p>
-            <a:endParaRPr lang="fr-FR" dirty="0"/>
+        <p:spPr>
+          <a:xfrm>
+            <a:off x="838199" y="1825625"/>
+            <a:ext cx="7595795" cy="4351338"/>
+          </a:xfrm>
+        </p:spPr>
+        <p:txBody>
+          <a:bodyPr/>
+          <a:lstStyle/>
+          <a:p>
+            <a:pPr marL="0" indent="0">
+              <a:buNone/>
+            </a:pPr>
+            <a:r>
+              <a:rPr lang="fr-FR" dirty="0"/>
+              <a:t> </a:t>
+            </a:r>
           </a:p>
         </p:txBody>
       </p:sp>
       <p:pic>
         <p:nvPicPr>
-          <p:cNvPr id="6" name="Espace réservé du contenu 5">
-            <a:extLst>
-              <a:ext uri="{FF2B5EF4-FFF2-40B4-BE49-F238E27FC236}">
-                <a16:creationId xmlns:a16="http://schemas.microsoft.com/office/drawing/2014/main" id="{C95CFB5B-139C-9E36-17A0-9661B6A0DB45}"/>
+          <p:cNvPr id="10" name="Espace réservé du contenu 9" descr="Une image contenant croquis, dessin, diagramme, blanc&#10;&#10;Description générée automatiquement">
+            <a:extLst>
+              <a:ext uri="{FF2B5EF4-FFF2-40B4-BE49-F238E27FC236}">
+                <a16:creationId xmlns:a16="http://schemas.microsoft.com/office/drawing/2014/main" id="{DA554EBB-ED5C-66C8-4E81-6856E598BE9B}"/>
               </a:ext>
             </a:extLst>
           </p:cNvPr>
@@ -4634,15 +4657,21 @@
           </p:nvPr>
         </p:nvPicPr>
         <p:blipFill>
-          <a:blip r:embed="rId2"/>
+          <a:blip r:embed="rId2">
+            <a:extLst>
+              <a:ext uri="{28A0092B-C50C-407E-A947-70E740481C1C}">
+                <a14:useLocalDpi xmlns:a14="http://schemas.microsoft.com/office/drawing/2010/main" val="0"/>
+              </a:ext>
+            </a:extLst>
+          </a:blip>
           <a:stretch>
             <a:fillRect/>
           </a:stretch>
         </p:blipFill>
         <p:spPr>
           <a:xfrm>
-            <a:off x="6172200" y="2845594"/>
-            <a:ext cx="5181600" cy="2311400"/>
+            <a:off x="9176273" y="110406"/>
+            <a:ext cx="2802367" cy="6637187"/>
           </a:xfrm>
         </p:spPr>
       </p:pic>
@@ -4845,35 +4874,45 @@
           <a:bodyPr/>
           <a:lstStyle/>
           <a:p>
-            <a:endParaRPr lang="fr-FR"/>
-          </a:p>
-        </p:txBody>
-      </p:sp>
-      <p:sp>
-        <p:nvSpPr>
-          <p:cNvPr id="9" name="Espace réservé du contenu 8">
-            <a:extLst>
-              <a:ext uri="{FF2B5EF4-FFF2-40B4-BE49-F238E27FC236}">
-                <a16:creationId xmlns:a16="http://schemas.microsoft.com/office/drawing/2014/main" id="{AB116B9B-A460-342C-1FE3-D9CD6C057CEF}"/>
-              </a:ext>
-            </a:extLst>
-          </p:cNvPr>
-          <p:cNvSpPr>
-            <a:spLocks noGrp="1"/>
-          </p:cNvSpPr>
+            <a:pPr marL="0" indent="0">
+              <a:buNone/>
+            </a:pPr>
+            <a:r>
+              <a:rPr lang="fr-FR" dirty="0"/>
+              <a:t> </a:t>
+            </a:r>
+          </a:p>
+        </p:txBody>
+      </p:sp>
+      <p:pic>
+        <p:nvPicPr>
+          <p:cNvPr id="3" name="Espace réservé du contenu 2">
+            <a:extLst>
+              <a:ext uri="{FF2B5EF4-FFF2-40B4-BE49-F238E27FC236}">
+                <a16:creationId xmlns:a16="http://schemas.microsoft.com/office/drawing/2014/main" id="{769FC6BB-93F6-2280-AA2C-DD16C45E8E06}"/>
+              </a:ext>
+            </a:extLst>
+          </p:cNvPr>
+          <p:cNvPicPr>
+            <a:picLocks noGrp="1" noChangeAspect="1"/>
+          </p:cNvPicPr>
           <p:nvPr>
             <p:ph sz="half" idx="2"/>
           </p:nvPr>
-        </p:nvSpPr>
-        <p:spPr/>
-        <p:txBody>
-          <a:bodyPr/>
-          <a:lstStyle/>
-          <a:p>
-            <a:endParaRPr lang="fr-FR"/>
-          </a:p>
-        </p:txBody>
-      </p:sp>
+        </p:nvPicPr>
+        <p:blipFill>
+          <a:blip r:embed="rId2"/>
+          <a:stretch>
+            <a:fillRect/>
+          </a:stretch>
+        </p:blipFill>
+        <p:spPr>
+          <a:xfrm>
+            <a:off x="6096000" y="671091"/>
+            <a:ext cx="6014277" cy="5821784"/>
+          </a:xfrm>
+        </p:spPr>
+      </p:pic>
     </p:spTree>
     <p:extLst>
       <p:ext uri="{BB962C8B-B14F-4D97-AF65-F5344CB8AC3E}">
@@ -4948,40 +4987,55 @@
             <p:ph sz="half" idx="1"/>
           </p:nvPr>
         </p:nvSpPr>
-        <p:spPr/>
-        <p:txBody>
-          <a:bodyPr/>
-          <a:lstStyle/>
-          <a:p>
-            <a:endParaRPr lang="fr-FR"/>
-          </a:p>
-        </p:txBody>
-      </p:sp>
-      <p:sp>
-        <p:nvSpPr>
-          <p:cNvPr id="4" name="Espace réservé du contenu 3">
-            <a:extLst>
-              <a:ext uri="{FF2B5EF4-FFF2-40B4-BE49-F238E27FC236}">
-                <a16:creationId xmlns:a16="http://schemas.microsoft.com/office/drawing/2014/main" id="{95C7CE34-0762-285E-1983-71D01908E2BF}"/>
-              </a:ext>
-            </a:extLst>
-          </p:cNvPr>
-          <p:cNvSpPr>
-            <a:spLocks noGrp="1"/>
-          </p:cNvSpPr>
+        <p:spPr>
+          <a:xfrm>
+            <a:off x="838200" y="1825625"/>
+            <a:ext cx="4833471" cy="4351338"/>
+          </a:xfrm>
+        </p:spPr>
+        <p:txBody>
+          <a:bodyPr/>
+          <a:lstStyle/>
+          <a:p>
+            <a:pPr marL="0" indent="0">
+              <a:buNone/>
+            </a:pPr>
+            <a:r>
+              <a:rPr lang="fr-FR" dirty="0"/>
+              <a:t> </a:t>
+            </a:r>
+          </a:p>
+        </p:txBody>
+      </p:sp>
+      <p:pic>
+        <p:nvPicPr>
+          <p:cNvPr id="6" name="Espace réservé du contenu 5">
+            <a:extLst>
+              <a:ext uri="{FF2B5EF4-FFF2-40B4-BE49-F238E27FC236}">
+                <a16:creationId xmlns:a16="http://schemas.microsoft.com/office/drawing/2014/main" id="{F3100FFB-8EDE-56A9-449C-05C488C33089}"/>
+              </a:ext>
+            </a:extLst>
+          </p:cNvPr>
+          <p:cNvPicPr>
+            <a:picLocks noGrp="1" noChangeAspect="1"/>
+          </p:cNvPicPr>
           <p:nvPr>
             <p:ph sz="half" idx="2"/>
           </p:nvPr>
-        </p:nvSpPr>
-        <p:spPr/>
-        <p:txBody>
-          <a:bodyPr/>
-          <a:lstStyle/>
-          <a:p>
-            <a:endParaRPr lang="fr-FR"/>
-          </a:p>
-        </p:txBody>
-      </p:sp>
+        </p:nvPicPr>
+        <p:blipFill>
+          <a:blip r:embed="rId2"/>
+          <a:stretch>
+            <a:fillRect/>
+          </a:stretch>
+        </p:blipFill>
+        <p:spPr>
+          <a:xfrm>
+            <a:off x="5873909" y="1690688"/>
+            <a:ext cx="6218079" cy="4206576"/>
+          </a:xfrm>
+        </p:spPr>
+      </p:pic>
     </p:spTree>
     <p:extLst>
       <p:ext uri="{BB962C8B-B14F-4D97-AF65-F5344CB8AC3E}">
@@ -6912,8 +6966,19 @@
               <a:t>High </a:t>
             </a:r>
             <a:r>
-              <a:rPr lang="fr-FR"/>
+              <a:rPr lang="fr-FR" dirty="0" err="1"/>
               <a:t>contrast</a:t>
+            </a:r>
+            <a:endParaRPr lang="fr-FR" dirty="0"/>
+          </a:p>
+          <a:p>
+            <a:r>
+              <a:rPr lang="fr-FR" dirty="0"/>
+              <a:t>High </a:t>
+            </a:r>
+            <a:r>
+              <a:rPr lang="fr-FR" dirty="0" err="1"/>
+              <a:t>sensitivity</a:t>
             </a:r>
             <a:endParaRPr lang="fr-FR" dirty="0"/>
           </a:p>
@@ -7027,7 +7092,12 @@
             <p:ph sz="half" idx="1"/>
           </p:nvPr>
         </p:nvSpPr>
-        <p:spPr/>
+        <p:spPr>
+          <a:xfrm>
+            <a:off x="838200" y="1825625"/>
+            <a:ext cx="5616388" cy="4351338"/>
+          </a:xfrm>
+        </p:spPr>
         <p:txBody>
           <a:bodyPr>
             <a:normAutofit/>
@@ -7036,31 +7106,31 @@
           <a:p>
             <a:r>
               <a:rPr lang="en-US" dirty="0"/>
-              <a:t>Transit</a:t>
+              <a:t>Transit (4342)</a:t>
             </a:r>
           </a:p>
           <a:p>
             <a:r>
               <a:rPr lang="en-US" dirty="0"/>
-              <a:t>Radial Velocity</a:t>
+              <a:t>Radial Velocity (1098)</a:t>
             </a:r>
           </a:p>
           <a:p>
             <a:r>
               <a:rPr lang="en-US" dirty="0"/>
-              <a:t>Gravitational microlensing</a:t>
+              <a:t>Gravitational microlensing (235)</a:t>
             </a:r>
           </a:p>
           <a:p>
             <a:r>
               <a:rPr lang="en-US" dirty="0"/>
-              <a:t>Direct imaging</a:t>
+              <a:t>Direct imaging (82)</a:t>
             </a:r>
           </a:p>
           <a:p>
             <a:r>
               <a:rPr lang="en-US" dirty="0"/>
-              <a:t>Astrometry</a:t>
+              <a:t>Astrometry (3)</a:t>
             </a:r>
           </a:p>
           <a:p>
@@ -7072,18 +7142,6 @@
             </a:pPr>
             <a:endParaRPr lang="en-US" dirty="0"/>
           </a:p>
-          <a:p>
-            <a:pPr marL="0" indent="0">
-              <a:buNone/>
-            </a:pPr>
-            <a:r>
-              <a:rPr lang="en-US" sz="1800" dirty="0">
-                <a:hlinkClick r:id="rId2"/>
-              </a:rPr>
-              <a:t>https://exoplanets.nasa.gov/alien-worlds/ways-to-find-a-planet/</a:t>
-            </a:r>
-            <a:endParaRPr lang="en-US" sz="1800" dirty="0"/>
-          </a:p>
         </p:txBody>
       </p:sp>
       <p:pic>
@@ -7103,7 +7161,7 @@
           </p:nvPr>
         </p:nvPicPr>
         <p:blipFill>
-          <a:blip r:embed="rId3"/>
+          <a:blip r:embed="rId2"/>
           <a:stretch>
             <a:fillRect/>
           </a:stretch>
@@ -7115,6 +7173,47 @@
           </a:xfrm>
         </p:spPr>
       </p:pic>
+      <p:sp>
+        <p:nvSpPr>
+          <p:cNvPr id="3" name="ZoneTexte 2">
+            <a:extLst>
+              <a:ext uri="{FF2B5EF4-FFF2-40B4-BE49-F238E27FC236}">
+                <a16:creationId xmlns:a16="http://schemas.microsoft.com/office/drawing/2014/main" id="{903473CA-16C6-A590-3126-AEC72F4D4C06}"/>
+              </a:ext>
+            </a:extLst>
+          </p:cNvPr>
+          <p:cNvSpPr txBox="1"/>
+          <p:nvPr/>
+        </p:nvSpPr>
+        <p:spPr>
+          <a:xfrm>
+            <a:off x="181535" y="6338986"/>
+            <a:ext cx="6096896" cy="307777"/>
+          </a:xfrm>
+          <a:prstGeom prst="rect">
+            <a:avLst/>
+          </a:prstGeom>
+          <a:noFill/>
+        </p:spPr>
+        <p:txBody>
+          <a:bodyPr wrap="square">
+            <a:spAutoFit/>
+          </a:bodyPr>
+          <a:lstStyle/>
+          <a:p>
+            <a:pPr marL="0" indent="0">
+              <a:buNone/>
+            </a:pPr>
+            <a:r>
+              <a:rPr lang="en-US" sz="1400" dirty="0">
+                <a:hlinkClick r:id="rId3"/>
+              </a:rPr>
+              <a:t>https://exoplanets.nasa.gov/alien-worlds/ways-to-find-a-planet/</a:t>
+            </a:r>
+            <a:endParaRPr lang="en-US" sz="1400" dirty="0"/>
+          </a:p>
+        </p:txBody>
+      </p:sp>
     </p:spTree>
     <p:extLst>
       <p:ext uri="{BB962C8B-B14F-4D97-AF65-F5344CB8AC3E}">

</xml_diff>